<commit_message>
ajuste na definição do Git e nas referências
</commit_message>
<xml_diff>
--- a/versionamento-de-arquivos.pptx
+++ b/versionamento-de-arquivos.pptx
@@ -208,7 +208,7 @@
           <a:p>
             <a:fld id="{94D3EB41-CF60-4C9F-BD83-AE56FA0945EB}" type="datetimeFigureOut">
               <a:rPr lang="pt-BR" smtClean="0"/>
-              <a:t>01/02/2019</a:t>
+              <a:t>04/02/2019</a:t>
             </a:fld>
             <a:endParaRPr lang="pt-BR"/>
           </a:p>
@@ -366,7 +366,7 @@
           <a:p>
             <a:fld id="{020F486D-935E-4125-8FD7-C735663CC7DE}" type="slidenum">
               <a:rPr lang="pt-BR" smtClean="0"/>
-              <a:t>‹nº›</a:t>
+              <a:t>‹#›</a:t>
             </a:fld>
             <a:endParaRPr lang="pt-BR"/>
           </a:p>
@@ -970,7 +970,7 @@
           <a:p>
             <a:fld id="{9642BF85-54FF-46CE-B398-87F998CFD60B}" type="datetimeFigureOut">
               <a:rPr lang="pt-BR" smtClean="0"/>
-              <a:t>01/02/2019</a:t>
+              <a:t>04/02/2019</a:t>
             </a:fld>
             <a:endParaRPr lang="pt-BR"/>
           </a:p>
@@ -1012,7 +1012,7 @@
           <a:p>
             <a:fld id="{29185252-FBA3-417A-8652-C405B89605D8}" type="slidenum">
               <a:rPr lang="pt-BR" smtClean="0"/>
-              <a:t>‹nº›</a:t>
+              <a:t>‹#›</a:t>
             </a:fld>
             <a:endParaRPr lang="pt-BR"/>
           </a:p>
@@ -1138,7 +1138,7 @@
           <a:p>
             <a:fld id="{9642BF85-54FF-46CE-B398-87F998CFD60B}" type="datetimeFigureOut">
               <a:rPr lang="pt-BR" smtClean="0"/>
-              <a:t>01/02/2019</a:t>
+              <a:t>04/02/2019</a:t>
             </a:fld>
             <a:endParaRPr lang="pt-BR"/>
           </a:p>
@@ -1180,7 +1180,7 @@
           <a:p>
             <a:fld id="{29185252-FBA3-417A-8652-C405B89605D8}" type="slidenum">
               <a:rPr lang="pt-BR" smtClean="0"/>
-              <a:t>‹nº›</a:t>
+              <a:t>‹#›</a:t>
             </a:fld>
             <a:endParaRPr lang="pt-BR"/>
           </a:p>
@@ -1316,7 +1316,7 @@
           <a:p>
             <a:fld id="{9642BF85-54FF-46CE-B398-87F998CFD60B}" type="datetimeFigureOut">
               <a:rPr lang="pt-BR" smtClean="0"/>
-              <a:t>01/02/2019</a:t>
+              <a:t>04/02/2019</a:t>
             </a:fld>
             <a:endParaRPr lang="pt-BR"/>
           </a:p>
@@ -1358,7 +1358,7 @@
           <a:p>
             <a:fld id="{29185252-FBA3-417A-8652-C405B89605D8}" type="slidenum">
               <a:rPr lang="pt-BR" smtClean="0"/>
-              <a:t>‹nº›</a:t>
+              <a:t>‹#›</a:t>
             </a:fld>
             <a:endParaRPr lang="pt-BR"/>
           </a:p>
@@ -1653,7 +1653,7 @@
           <a:p>
             <a:fld id="{9642BF85-54FF-46CE-B398-87F998CFD60B}" type="datetimeFigureOut">
               <a:rPr lang="pt-BR" smtClean="0"/>
-              <a:t>01/02/2019</a:t>
+              <a:t>04/02/2019</a:t>
             </a:fld>
             <a:endParaRPr lang="pt-BR"/>
           </a:p>
@@ -1695,7 +1695,7 @@
           <a:p>
             <a:fld id="{29185252-FBA3-417A-8652-C405B89605D8}" type="slidenum">
               <a:rPr lang="pt-BR" smtClean="0"/>
-              <a:t>‹nº›</a:t>
+              <a:t>‹#›</a:t>
             </a:fld>
             <a:endParaRPr lang="pt-BR"/>
           </a:p>
@@ -1924,7 +1924,7 @@
           <a:p>
             <a:fld id="{9642BF85-54FF-46CE-B398-87F998CFD60B}" type="datetimeFigureOut">
               <a:rPr lang="pt-BR" smtClean="0"/>
-              <a:t>01/02/2019</a:t>
+              <a:t>04/02/2019</a:t>
             </a:fld>
             <a:endParaRPr lang="pt-BR"/>
           </a:p>
@@ -1966,7 +1966,7 @@
           <a:p>
             <a:fld id="{29185252-FBA3-417A-8652-C405B89605D8}" type="slidenum">
               <a:rPr lang="pt-BR" smtClean="0"/>
-              <a:t>‹nº›</a:t>
+              <a:t>‹#›</a:t>
             </a:fld>
             <a:endParaRPr lang="pt-BR"/>
           </a:p>
@@ -2170,7 +2170,7 @@
           <a:p>
             <a:fld id="{9642BF85-54FF-46CE-B398-87F998CFD60B}" type="datetimeFigureOut">
               <a:rPr lang="pt-BR" smtClean="0"/>
-              <a:t>01/02/2019</a:t>
+              <a:t>04/02/2019</a:t>
             </a:fld>
             <a:endParaRPr lang="pt-BR"/>
           </a:p>
@@ -2212,7 +2212,7 @@
           <a:p>
             <a:fld id="{29185252-FBA3-417A-8652-C405B89605D8}" type="slidenum">
               <a:rPr lang="pt-BR" smtClean="0"/>
-              <a:t>‹nº›</a:t>
+              <a:t>‹#›</a:t>
             </a:fld>
             <a:endParaRPr lang="pt-BR"/>
           </a:p>
@@ -2534,7 +2534,7 @@
           <a:p>
             <a:fld id="{9642BF85-54FF-46CE-B398-87F998CFD60B}" type="datetimeFigureOut">
               <a:rPr lang="pt-BR" smtClean="0"/>
-              <a:t>01/02/2019</a:t>
+              <a:t>04/02/2019</a:t>
             </a:fld>
             <a:endParaRPr lang="pt-BR"/>
           </a:p>
@@ -2576,7 +2576,7 @@
           <a:p>
             <a:fld id="{29185252-FBA3-417A-8652-C405B89605D8}" type="slidenum">
               <a:rPr lang="pt-BR" smtClean="0"/>
-              <a:t>‹nº›</a:t>
+              <a:t>‹#›</a:t>
             </a:fld>
             <a:endParaRPr lang="pt-BR"/>
           </a:p>
@@ -2668,7 +2668,7 @@
           <a:p>
             <a:fld id="{9642BF85-54FF-46CE-B398-87F998CFD60B}" type="datetimeFigureOut">
               <a:rPr lang="pt-BR" smtClean="0"/>
-              <a:t>01/02/2019</a:t>
+              <a:t>04/02/2019</a:t>
             </a:fld>
             <a:endParaRPr lang="pt-BR"/>
           </a:p>
@@ -2710,7 +2710,7 @@
           <a:p>
             <a:fld id="{29185252-FBA3-417A-8652-C405B89605D8}" type="slidenum">
               <a:rPr lang="pt-BR" smtClean="0"/>
-              <a:t>‹nº›</a:t>
+              <a:t>‹#›</a:t>
             </a:fld>
             <a:endParaRPr lang="pt-BR"/>
           </a:p>
@@ -2763,7 +2763,7 @@
           <a:p>
             <a:fld id="{9642BF85-54FF-46CE-B398-87F998CFD60B}" type="datetimeFigureOut">
               <a:rPr lang="pt-BR" smtClean="0"/>
-              <a:t>01/02/2019</a:t>
+              <a:t>04/02/2019</a:t>
             </a:fld>
             <a:endParaRPr lang="pt-BR"/>
           </a:p>
@@ -2805,7 +2805,7 @@
           <a:p>
             <a:fld id="{29185252-FBA3-417A-8652-C405B89605D8}" type="slidenum">
               <a:rPr lang="pt-BR" smtClean="0"/>
-              <a:t>‹nº›</a:t>
+              <a:t>‹#›</a:t>
             </a:fld>
             <a:endParaRPr lang="pt-BR"/>
           </a:p>
@@ -3038,7 +3038,7 @@
           <a:p>
             <a:fld id="{9642BF85-54FF-46CE-B398-87F998CFD60B}" type="datetimeFigureOut">
               <a:rPr lang="pt-BR" smtClean="0"/>
-              <a:t>01/02/2019</a:t>
+              <a:t>04/02/2019</a:t>
             </a:fld>
             <a:endParaRPr lang="pt-BR"/>
           </a:p>
@@ -3080,7 +3080,7 @@
           <a:p>
             <a:fld id="{29185252-FBA3-417A-8652-C405B89605D8}" type="slidenum">
               <a:rPr lang="pt-BR" smtClean="0"/>
-              <a:t>‹nº›</a:t>
+              <a:t>‹#›</a:t>
             </a:fld>
             <a:endParaRPr lang="pt-BR"/>
           </a:p>
@@ -3290,7 +3290,7 @@
           <a:p>
             <a:fld id="{9642BF85-54FF-46CE-B398-87F998CFD60B}" type="datetimeFigureOut">
               <a:rPr lang="pt-BR" smtClean="0"/>
-              <a:t>01/02/2019</a:t>
+              <a:t>04/02/2019</a:t>
             </a:fld>
             <a:endParaRPr lang="pt-BR"/>
           </a:p>
@@ -3332,7 +3332,7 @@
           <a:p>
             <a:fld id="{29185252-FBA3-417A-8652-C405B89605D8}" type="slidenum">
               <a:rPr lang="pt-BR" smtClean="0"/>
-              <a:t>‹nº›</a:t>
+              <a:t>‹#›</a:t>
             </a:fld>
             <a:endParaRPr lang="pt-BR"/>
           </a:p>
@@ -3510,7 +3510,7 @@
           <a:p>
             <a:fld id="{9642BF85-54FF-46CE-B398-87F998CFD60B}" type="datetimeFigureOut">
               <a:rPr lang="pt-BR" smtClean="0"/>
-              <a:t>01/02/2019</a:t>
+              <a:t>04/02/2019</a:t>
             </a:fld>
             <a:endParaRPr lang="pt-BR"/>
           </a:p>
@@ -3588,7 +3588,7 @@
           <a:p>
             <a:fld id="{29185252-FBA3-417A-8652-C405B89605D8}" type="slidenum">
               <a:rPr lang="pt-BR" smtClean="0"/>
-              <a:t>‹nº›</a:t>
+              <a:t>‹#›</a:t>
             </a:fld>
             <a:endParaRPr lang="pt-BR"/>
           </a:p>
@@ -3949,18 +3949,9 @@
           <a:lstStyle/>
           <a:p>
             <a:r>
-              <a:rPr lang="pt-BR" dirty="0" smtClean="0"/>
-              <a:t>Controle de Versão </a:t>
-            </a:r>
-            <a:r>
-              <a:rPr lang="pt-BR" dirty="0" smtClean="0"/>
-              <a:t>de </a:t>
-            </a:r>
-            <a:r>
-              <a:rPr lang="pt-BR" dirty="0" smtClean="0"/>
-              <a:t>Arquivos</a:t>
-            </a:r>
-            <a:endParaRPr lang="pt-BR" dirty="0"/>
+              <a:rPr lang="pt-BR" dirty="0"/>
+              <a:t>Controle de Versão de Arquivos</a:t>
+            </a:r>
           </a:p>
         </p:txBody>
       </p:sp>
@@ -4045,7 +4036,7 @@
           <a:lstStyle/>
           <a:p>
             <a:r>
-              <a:rPr lang="pt-BR" dirty="0" err="1" smtClean="0"/>
+              <a:rPr lang="pt-BR" dirty="0" err="1"/>
               <a:t>DVCSs</a:t>
             </a:r>
             <a:endParaRPr lang="pt-BR" dirty="0"/>
@@ -4139,33 +4130,50 @@
           <a:lstStyle/>
           <a:p>
             <a:r>
-              <a:rPr lang="pt-BR" dirty="0" smtClean="0"/>
+              <a:rPr lang="pt-BR" dirty="0"/>
               <a:t>GitHub</a:t>
             </a:r>
+          </a:p>
+        </p:txBody>
+      </p:sp>
+      <p:sp>
+        <p:nvSpPr>
+          <p:cNvPr id="3" name="Espaço Reservado para Conteúdo 2"/>
+          <p:cNvSpPr>
+            <a:spLocks noGrp="1"/>
+          </p:cNvSpPr>
+          <p:nvPr>
+            <p:ph idx="1"/>
+          </p:nvPr>
+        </p:nvSpPr>
+        <p:spPr/>
+        <p:txBody>
+          <a:bodyPr>
+            <a:normAutofit/>
+          </a:bodyPr>
+          <a:lstStyle/>
+          <a:p>
+            <a:r>
+              <a:rPr lang="pt-BR" dirty="0"/>
+              <a:t>GitHub é uma plataforma de hospedagem de códigos para controle de versão e colaboração.</a:t>
+            </a:r>
+          </a:p>
+          <a:p>
             <a:endParaRPr lang="pt-BR" dirty="0"/>
           </a:p>
-        </p:txBody>
-      </p:sp>
-      <p:sp>
-        <p:nvSpPr>
-          <p:cNvPr id="3" name="Espaço Reservado para Conteúdo 2"/>
-          <p:cNvSpPr>
-            <a:spLocks noGrp="1"/>
-          </p:cNvSpPr>
-          <p:nvPr>
-            <p:ph idx="1"/>
-          </p:nvPr>
-        </p:nvSpPr>
-        <p:spPr/>
-        <p:txBody>
-          <a:bodyPr/>
-          <a:lstStyle/>
-          <a:p>
-            <a:r>
-              <a:rPr lang="pt-BR" dirty="0" smtClean="0"/>
-              <a:t>GitHub é uma plataforma de hospedagem de códigos para controle de versão e colaboração.</a:t>
-            </a:r>
-            <a:endParaRPr lang="pt-BR" dirty="0"/>
+          <a:p>
+            <a:r>
+              <a:rPr lang="pt-BR" dirty="0"/>
+              <a:t>Muitas pessoas criam uma conta no GitHub quando querem contribuir com projetos open </a:t>
+            </a:r>
+            <a:r>
+              <a:rPr lang="pt-BR" dirty="0" err="1"/>
+              <a:t>source</a:t>
+            </a:r>
+            <a:r>
+              <a:rPr lang="pt-BR" dirty="0"/>
+              <a:t> (código aberto), ou quando são convidadas por colegas de trabalho ou de classe que usam o GitHub em seus projetos.</a:t>
+            </a:r>
           </a:p>
         </p:txBody>
       </p:sp>
@@ -4215,10 +4223,9 @@
           <a:lstStyle/>
           <a:p>
             <a:r>
-              <a:rPr lang="pt-BR" dirty="0" smtClean="0"/>
+              <a:rPr lang="pt-BR" dirty="0"/>
               <a:t>Referências</a:t>
             </a:r>
-            <a:endParaRPr lang="pt-BR" dirty="0"/>
           </a:p>
         </p:txBody>
       </p:sp>
@@ -4244,53 +4251,41 @@
               <a:buAutoNum type="arabicPeriod"/>
             </a:pPr>
             <a:r>
-              <a:rPr lang="pt-BR" dirty="0" err="1" smtClean="0"/>
+              <a:rPr lang="pt-BR" dirty="0" err="1"/>
               <a:t>Chacon</a:t>
             </a:r>
             <a:r>
-              <a:rPr lang="pt-BR" dirty="0" smtClean="0"/>
+              <a:rPr lang="pt-BR" dirty="0"/>
               <a:t>, S; </a:t>
             </a:r>
             <a:r>
-              <a:rPr lang="pt-BR" dirty="0" err="1" smtClean="0"/>
+              <a:rPr lang="pt-BR" dirty="0" err="1"/>
               <a:t>Straub</a:t>
             </a:r>
             <a:r>
-              <a:rPr lang="pt-BR" dirty="0" smtClean="0"/>
+              <a:rPr lang="pt-BR" dirty="0"/>
               <a:t>, B. </a:t>
             </a:r>
             <a:r>
-              <a:rPr lang="pt-BR" b="1" dirty="0" smtClean="0"/>
+              <a:rPr lang="pt-BR" b="1" dirty="0"/>
               <a:t>Pro </a:t>
             </a:r>
             <a:r>
-              <a:rPr lang="pt-BR" b="1" dirty="0" err="1" smtClean="0"/>
+              <a:rPr lang="pt-BR" b="1" dirty="0" err="1"/>
               <a:t>Git</a:t>
             </a:r>
             <a:r>
-              <a:rPr lang="pt-BR" dirty="0" smtClean="0"/>
+              <a:rPr lang="pt-BR" dirty="0"/>
               <a:t>. Disponível em: </a:t>
-            </a:r>
-            <a:r>
-              <a:rPr lang="pt-BR" dirty="0" smtClean="0">
-                <a:hlinkClick r:id="rId3"/>
-              </a:rPr>
-              <a:t>https</a:t>
             </a:r>
             <a:r>
               <a:rPr lang="pt-BR" dirty="0">
                 <a:hlinkClick r:id="rId3"/>
               </a:rPr>
-              <a:t>://</a:t>
-            </a:r>
-            <a:r>
-              <a:rPr lang="pt-BR" dirty="0" smtClean="0">
-                <a:hlinkClick r:id="rId3"/>
-              </a:rPr>
-              <a:t>git-scm.com/book/en/v2</a:t>
-            </a:r>
-            <a:r>
-              <a:rPr lang="pt-BR" dirty="0" smtClean="0"/>
+              <a:t>https://git-scm.com/book/en/v2</a:t>
+            </a:r>
+            <a:r>
+              <a:rPr lang="pt-BR" dirty="0"/>
               <a:t>.</a:t>
             </a:r>
           </a:p>
@@ -4300,48 +4295,36 @@
               <a:buAutoNum type="arabicPeriod"/>
             </a:pPr>
             <a:r>
-              <a:rPr lang="pt-BR" dirty="0" smtClean="0"/>
+              <a:rPr lang="pt-BR" dirty="0"/>
               <a:t>GitHub </a:t>
             </a:r>
             <a:r>
-              <a:rPr lang="pt-BR" dirty="0" err="1" smtClean="0"/>
+              <a:rPr lang="pt-BR" dirty="0" err="1"/>
               <a:t>Guides</a:t>
             </a:r>
             <a:r>
-              <a:rPr lang="pt-BR" dirty="0" smtClean="0"/>
+              <a:rPr lang="pt-BR" dirty="0"/>
               <a:t>. </a:t>
             </a:r>
             <a:r>
-              <a:rPr lang="pt-BR" b="1" dirty="0" err="1" smtClean="0"/>
+              <a:rPr lang="pt-BR" b="1" dirty="0" err="1"/>
               <a:t>Hello</a:t>
             </a:r>
             <a:r>
-              <a:rPr lang="pt-BR" b="1" dirty="0" smtClean="0"/>
+              <a:rPr lang="pt-BR" b="1" dirty="0"/>
               <a:t> World</a:t>
             </a:r>
             <a:r>
-              <a:rPr lang="pt-BR" dirty="0" smtClean="0"/>
+              <a:rPr lang="pt-BR" dirty="0"/>
               <a:t>. Disponível em: </a:t>
-            </a:r>
-            <a:r>
-              <a:rPr lang="pt-BR" dirty="0" smtClean="0">
-                <a:hlinkClick r:id="rId4"/>
-              </a:rPr>
-              <a:t>https</a:t>
             </a:r>
             <a:r>
               <a:rPr lang="pt-BR" dirty="0">
                 <a:hlinkClick r:id="rId4"/>
               </a:rPr>
-              <a:t>://guides.github.com/activities/hello-world</a:t>
-            </a:r>
-            <a:r>
-              <a:rPr lang="pt-BR" dirty="0" smtClean="0">
-                <a:hlinkClick r:id="rId4"/>
-              </a:rPr>
-              <a:t>/</a:t>
-            </a:r>
-            <a:endParaRPr lang="pt-BR" dirty="0" smtClean="0"/>
+              <a:t>https://guides.github.com/activities/hello-world/</a:t>
+            </a:r>
+            <a:endParaRPr lang="pt-BR" dirty="0"/>
           </a:p>
           <a:p>
             <a:pPr marL="514350" indent="-514350" algn="l">
@@ -4349,10 +4332,13 @@
               <a:buAutoNum type="arabicPeriod"/>
             </a:pPr>
             <a:r>
+              <a:rPr lang="pt-BR" b="1" dirty="0"/>
+              <a:t>GitHub Learning Lab</a:t>
+            </a:r>
+            <a:r>
               <a:rPr lang="pt-BR" dirty="0"/>
-              <a:t>https://lab.github.com/</a:t>
-            </a:r>
-            <a:endParaRPr lang="pt-BR" dirty="0"/>
+              <a:t>. Disponível em: https://lab.github.com/</a:t>
+            </a:r>
           </a:p>
         </p:txBody>
       </p:sp>
@@ -4402,10 +4388,9 @@
           <a:lstStyle/>
           <a:p>
             <a:r>
-              <a:rPr lang="pt-BR" dirty="0" smtClean="0"/>
+              <a:rPr lang="pt-BR" dirty="0"/>
               <a:t>Sistema de Controle de Versão</a:t>
             </a:r>
-            <a:endParaRPr lang="pt-BR" dirty="0"/>
           </a:p>
         </p:txBody>
       </p:sp>
@@ -4427,66 +4412,33 @@
           <a:lstStyle/>
           <a:p>
             <a:r>
-              <a:rPr lang="pt-BR" dirty="0" smtClean="0"/>
-              <a:t>Sistemas de Controle </a:t>
-            </a:r>
-            <a:r>
               <a:rPr lang="pt-BR" dirty="0"/>
-              <a:t>de </a:t>
-            </a:r>
-            <a:r>
-              <a:rPr lang="pt-BR" dirty="0" smtClean="0"/>
-              <a:t>Versão (</a:t>
-            </a:r>
-            <a:r>
-              <a:rPr lang="pt-BR" b="1" dirty="0" smtClean="0"/>
+              <a:t>Sistemas de Controle de Versão (</a:t>
+            </a:r>
+            <a:r>
+              <a:rPr lang="pt-BR" b="1" dirty="0"/>
               <a:t>VCS – </a:t>
             </a:r>
             <a:r>
-              <a:rPr lang="pt-BR" b="1" i="1" dirty="0" err="1" smtClean="0"/>
+              <a:rPr lang="pt-BR" b="1" i="1" dirty="0" err="1"/>
               <a:t>Version</a:t>
             </a:r>
             <a:r>
-              <a:rPr lang="pt-BR" b="1" i="1" dirty="0" smtClean="0"/>
+              <a:rPr lang="pt-BR" b="1" i="1" dirty="0"/>
               <a:t> </a:t>
             </a:r>
             <a:r>
-              <a:rPr lang="pt-BR" b="1" i="1" dirty="0" err="1" smtClean="0"/>
+              <a:rPr lang="pt-BR" b="1" i="1" dirty="0" err="1"/>
               <a:t>Control</a:t>
             </a:r>
             <a:r>
-              <a:rPr lang="pt-BR" b="1" i="1" dirty="0" smtClean="0"/>
+              <a:rPr lang="pt-BR" b="1" i="1" dirty="0"/>
               <a:t> System</a:t>
             </a:r>
             <a:r>
-              <a:rPr lang="pt-BR" dirty="0" smtClean="0"/>
-              <a:t>) registram </a:t>
-            </a:r>
-            <a:r>
               <a:rPr lang="pt-BR" dirty="0"/>
-              <a:t>alterações em </a:t>
-            </a:r>
-            <a:r>
-              <a:rPr lang="pt-BR" dirty="0" smtClean="0"/>
-              <a:t>um ou mais </a:t>
-            </a:r>
-            <a:r>
-              <a:rPr lang="pt-BR" dirty="0"/>
-              <a:t>arquivos ao longo do tempo para que </a:t>
-            </a:r>
-            <a:r>
-              <a:rPr lang="pt-BR" dirty="0" smtClean="0"/>
-              <a:t>versões </a:t>
-            </a:r>
-            <a:r>
-              <a:rPr lang="pt-BR" dirty="0"/>
-              <a:t>específicas </a:t>
-            </a:r>
-            <a:r>
-              <a:rPr lang="pt-BR" dirty="0" smtClean="0"/>
-              <a:t>possam ser recuperadas mais tarde.</a:t>
-            </a:r>
-            <a:endParaRPr lang="pt-BR" dirty="0"/>
+              <a:t>) registram alterações em um ou mais arquivos ao longo do tempo para que versões específicas possam ser recuperadas mais tarde.</a:t>
+            </a:r>
           </a:p>
         </p:txBody>
       </p:sp>
@@ -4536,10 +4488,9 @@
           <a:lstStyle/>
           <a:p>
             <a:r>
-              <a:rPr lang="pt-BR" dirty="0" smtClean="0"/>
+              <a:rPr lang="pt-BR" dirty="0"/>
               <a:t>Por que devo usar um VCS? </a:t>
             </a:r>
-            <a:endParaRPr lang="pt-BR" dirty="0"/>
           </a:p>
         </p:txBody>
       </p:sp>
@@ -4561,40 +4512,15 @@
           <a:lstStyle/>
           <a:p>
             <a:r>
-              <a:rPr lang="pt-BR" dirty="0" smtClean="0"/>
-              <a:t>Um VCS </a:t>
-            </a:r>
-            <a:r>
               <a:rPr lang="pt-BR" dirty="0"/>
-              <a:t>permite que você </a:t>
-            </a:r>
-            <a:r>
-              <a:rPr lang="pt-BR" dirty="0" smtClean="0"/>
-              <a:t>compare as </a:t>
-            </a:r>
+              <a:t>Um VCS permite que você compare as mudanças realizadas em um arquivo, identificando autor, data e hora das alterações.</a:t>
+            </a:r>
+          </a:p>
+          <a:p>
             <a:r>
               <a:rPr lang="pt-BR" dirty="0"/>
-              <a:t>mudanças </a:t>
-            </a:r>
-            <a:r>
-              <a:rPr lang="pt-BR" dirty="0" smtClean="0"/>
-              <a:t>realizadas em um arquivo, identificando autor, data e hora das alterações.</a:t>
-            </a:r>
-          </a:p>
-          <a:p>
-            <a:r>
-              <a:rPr lang="pt-BR" dirty="0" smtClean="0"/>
-              <a:t>Permite ainda que você reverta o arquivo, ou até mesmo o projeto todo, a </a:t>
-            </a:r>
-            <a:r>
-              <a:rPr lang="pt-BR" dirty="0"/>
-              <a:t>um estado </a:t>
-            </a:r>
-            <a:r>
-              <a:rPr lang="pt-BR" dirty="0" smtClean="0"/>
-              <a:t>anterior.</a:t>
-            </a:r>
-            <a:endParaRPr lang="pt-BR" dirty="0"/>
+              <a:t>Permite ainda que você reverta o arquivo, ou até mesmo o projeto todo, a um estado anterior.</a:t>
+            </a:r>
           </a:p>
         </p:txBody>
       </p:sp>
@@ -4644,10 +4570,9 @@
           <a:lstStyle/>
           <a:p>
             <a:r>
-              <a:rPr lang="pt-BR" dirty="0" smtClean="0"/>
+              <a:rPr lang="pt-BR" dirty="0"/>
               <a:t>Tipos de VCS</a:t>
             </a:r>
-            <a:endParaRPr lang="pt-BR" dirty="0"/>
           </a:p>
         </p:txBody>
       </p:sp>
@@ -4667,7 +4592,7 @@
           <a:lstStyle/>
           <a:p>
             <a:r>
-              <a:rPr lang="pt-BR" dirty="0" smtClean="0"/>
+              <a:rPr lang="pt-BR" dirty="0"/>
               <a:t>A seguir, serão apresentados, brevemente, 3 tipos de VCS:</a:t>
             </a:r>
           </a:p>
@@ -4677,7 +4602,7 @@
               <a:buChar char="•"/>
             </a:pPr>
             <a:r>
-              <a:rPr lang="pt-BR" dirty="0" smtClean="0"/>
+              <a:rPr lang="pt-BR" dirty="0"/>
               <a:t>Sistemas Locais de Controle de Versão;</a:t>
             </a:r>
           </a:p>
@@ -4687,15 +4612,15 @@
               <a:buChar char="•"/>
             </a:pPr>
             <a:r>
-              <a:rPr lang="pt-BR" dirty="0" smtClean="0"/>
+              <a:rPr lang="pt-BR" dirty="0"/>
               <a:t>Sistemas Centralizados de Controle de Versão (</a:t>
             </a:r>
             <a:r>
-              <a:rPr lang="pt-BR" dirty="0" err="1" smtClean="0"/>
+              <a:rPr lang="pt-BR" dirty="0" err="1"/>
               <a:t>CVCSs</a:t>
             </a:r>
             <a:r>
-              <a:rPr lang="pt-BR" dirty="0" smtClean="0"/>
+              <a:rPr lang="pt-BR" dirty="0"/>
               <a:t>); e</a:t>
             </a:r>
           </a:p>
@@ -4705,26 +4630,17 @@
               <a:buChar char="•"/>
             </a:pPr>
             <a:r>
-              <a:rPr lang="pt-BR" dirty="0" smtClean="0"/>
-              <a:t>Sistemas Distribuídos de </a:t>
-            </a:r>
-            <a:r>
               <a:rPr lang="pt-BR" dirty="0"/>
-              <a:t>Controle de </a:t>
-            </a:r>
-            <a:r>
-              <a:rPr lang="pt-BR" dirty="0" smtClean="0"/>
-              <a:t>Versão (</a:t>
-            </a:r>
-            <a:r>
-              <a:rPr lang="pt-BR" dirty="0" err="1" smtClean="0"/>
+              <a:t>Sistemas Distribuídos de Controle de Versão (</a:t>
+            </a:r>
+            <a:r>
+              <a:rPr lang="pt-BR" dirty="0" err="1"/>
               <a:t>DVCSs</a:t>
             </a:r>
             <a:r>
-              <a:rPr lang="pt-BR" dirty="0" smtClean="0"/>
+              <a:rPr lang="pt-BR" dirty="0"/>
               <a:t>).</a:t>
             </a:r>
-            <a:endParaRPr lang="pt-BR" dirty="0"/>
           </a:p>
         </p:txBody>
       </p:sp>
@@ -4776,7 +4692,7 @@
           <a:lstStyle/>
           <a:p>
             <a:r>
-              <a:rPr lang="pt-BR" dirty="0" err="1" smtClean="0"/>
+              <a:rPr lang="pt-BR" dirty="0" err="1"/>
               <a:t>VCSs</a:t>
             </a:r>
             <a:endParaRPr lang="pt-BR" dirty="0"/>
@@ -4799,10 +4715,9 @@
           <a:lstStyle/>
           <a:p>
             <a:r>
-              <a:rPr lang="pt-BR" dirty="0" smtClean="0"/>
+              <a:rPr lang="pt-BR" dirty="0"/>
               <a:t>Trabalham com um banco de dados simples que mantem todas as alterações nos arquivos sob controle de versão.</a:t>
             </a:r>
-            <a:endParaRPr lang="pt-BR" dirty="0"/>
           </a:p>
         </p:txBody>
       </p:sp>
@@ -4854,7 +4769,7 @@
           <a:lstStyle/>
           <a:p>
             <a:r>
-              <a:rPr lang="pt-BR" dirty="0" err="1" smtClean="0"/>
+              <a:rPr lang="pt-BR" dirty="0" err="1"/>
               <a:t>VCSs</a:t>
             </a:r>
             <a:endParaRPr lang="pt-BR" dirty="0"/>
@@ -4877,18 +4792,9 @@
           <a:lstStyle/>
           <a:p>
             <a:r>
-              <a:rPr lang="pt-BR" dirty="0" smtClean="0"/>
-              <a:t>Estes sistemas funcionam </a:t>
-            </a:r>
-            <a:r>
               <a:rPr lang="pt-BR" dirty="0"/>
-              <a:t>mantendo conjuntos de alterações (ou seja, as diferenças entre os arquivos) em um formato especial no </a:t>
-            </a:r>
-            <a:r>
-              <a:rPr lang="pt-BR" dirty="0" smtClean="0"/>
-              <a:t>disco.</a:t>
-            </a:r>
-            <a:endParaRPr lang="pt-BR" dirty="0"/>
+              <a:t>Estes sistemas funcionam mantendo conjuntos de alterações (ou seja, as diferenças entre os arquivos) em um formato especial no disco.</a:t>
+            </a:r>
           </a:p>
         </p:txBody>
       </p:sp>
@@ -4981,7 +4887,7 @@
           <a:lstStyle/>
           <a:p>
             <a:r>
-              <a:rPr lang="pt-BR" dirty="0" err="1" smtClean="0"/>
+              <a:rPr lang="pt-BR" dirty="0" err="1"/>
               <a:t>CVCSs</a:t>
             </a:r>
             <a:endParaRPr lang="pt-BR" dirty="0"/>
@@ -5004,16 +4910,15 @@
           <a:lstStyle/>
           <a:p>
             <a:r>
-              <a:rPr lang="pt-BR" dirty="0" smtClean="0"/>
+              <a:rPr lang="pt-BR" dirty="0"/>
               <a:t>Trabalham com um servidor que armazena todos os arquivos sob controle de versão e seus respectivos históricos de alterações.</a:t>
             </a:r>
           </a:p>
           <a:p>
             <a:r>
-              <a:rPr lang="pt-BR" dirty="0" smtClean="0"/>
+              <a:rPr lang="pt-BR" dirty="0"/>
               <a:t>Os clientes usam estes arquivos a partir deste servidor central.</a:t>
             </a:r>
-            <a:endParaRPr lang="pt-BR" dirty="0"/>
           </a:p>
         </p:txBody>
       </p:sp>
@@ -5065,7 +4970,7 @@
           <a:lstStyle/>
           <a:p>
             <a:r>
-              <a:rPr lang="pt-BR" dirty="0" err="1" smtClean="0"/>
+              <a:rPr lang="pt-BR" dirty="0" err="1"/>
               <a:t>CVCSs</a:t>
             </a:r>
             <a:endParaRPr lang="pt-BR" dirty="0"/>
@@ -5088,42 +4993,9 @@
           <a:lstStyle/>
           <a:p>
             <a:r>
-              <a:rPr lang="pt-BR" dirty="0" smtClean="0"/>
-              <a:t>Todos sabem, </a:t>
-            </a:r>
-            <a:r>
               <a:rPr lang="pt-BR" dirty="0"/>
-              <a:t>até certo </a:t>
-            </a:r>
-            <a:r>
-              <a:rPr lang="pt-BR" dirty="0" smtClean="0"/>
-              <a:t>ponto, </a:t>
-            </a:r>
-            <a:r>
-              <a:rPr lang="pt-BR" dirty="0"/>
-              <a:t>o que </a:t>
-            </a:r>
-            <a:r>
-              <a:rPr lang="pt-BR" dirty="0" smtClean="0"/>
-              <a:t>todos colaboradores estão fazendo no projeto. </a:t>
-            </a:r>
-            <a:r>
-              <a:rPr lang="pt-BR" dirty="0"/>
-              <a:t>Os administradores têm </a:t>
-            </a:r>
-            <a:r>
-              <a:rPr lang="pt-BR" dirty="0" smtClean="0"/>
-              <a:t>controle </a:t>
-            </a:r>
-            <a:r>
-              <a:rPr lang="pt-BR" dirty="0"/>
-              <a:t>sobre </a:t>
-            </a:r>
-            <a:r>
-              <a:rPr lang="pt-BR" dirty="0" smtClean="0"/>
-              <a:t>a concessão de permissões aos colaboradores.</a:t>
-            </a:r>
-            <a:endParaRPr lang="pt-BR" dirty="0"/>
+              <a:t>Todos sabem, até certo ponto, o que todos colaboradores estão fazendo no projeto. Os administradores têm controle sobre a concessão de permissões aos colaboradores.</a:t>
+            </a:r>
           </a:p>
         </p:txBody>
       </p:sp>
@@ -5214,7 +5086,7 @@
           <a:lstStyle/>
           <a:p>
             <a:r>
-              <a:rPr lang="pt-BR" dirty="0" err="1" smtClean="0"/>
+              <a:rPr lang="pt-BR" dirty="0" err="1"/>
               <a:t>DVCSs</a:t>
             </a:r>
             <a:endParaRPr lang="pt-BR" dirty="0"/>
@@ -5239,64 +5111,15 @@
           <a:lstStyle/>
           <a:p>
             <a:r>
-              <a:rPr lang="pt-BR" dirty="0" smtClean="0"/>
-              <a:t>Além de usar </a:t>
-            </a:r>
-            <a:r>
               <a:rPr lang="pt-BR" dirty="0"/>
-              <a:t>o estado mais recente dos </a:t>
-            </a:r>
-            <a:r>
-              <a:rPr lang="pt-BR" dirty="0" smtClean="0"/>
-              <a:t>arquivos, os clientes destes sistemas duplicam, localmente, o repositório </a:t>
-            </a:r>
+              <a:t>Além de usar o estado mais recente dos arquivos, os clientes destes sistemas duplicam, localmente, o repositório completo.</a:t>
+            </a:r>
+          </a:p>
+          <a:p>
             <a:r>
               <a:rPr lang="pt-BR" dirty="0"/>
-              <a:t>completo</a:t>
-            </a:r>
-            <a:r>
-              <a:rPr lang="pt-BR" dirty="0" smtClean="0"/>
-              <a:t>.</a:t>
-            </a:r>
-          </a:p>
-          <a:p>
-            <a:r>
-              <a:rPr lang="pt-BR" dirty="0" smtClean="0"/>
-              <a:t>Muitos destes </a:t>
-            </a:r>
-            <a:r>
-              <a:rPr lang="pt-BR" dirty="0"/>
-              <a:t>sistemas trabalham </a:t>
-            </a:r>
-            <a:r>
-              <a:rPr lang="pt-BR" dirty="0" smtClean="0"/>
-              <a:t>com </a:t>
-            </a:r>
-            <a:r>
-              <a:rPr lang="pt-BR" dirty="0"/>
-              <a:t>vários repositórios remotos, </a:t>
-            </a:r>
-            <a:r>
-              <a:rPr lang="pt-BR" dirty="0" smtClean="0"/>
-              <a:t>possibilitando </a:t>
-            </a:r>
-            <a:r>
-              <a:rPr lang="pt-BR" dirty="0"/>
-              <a:t>que </a:t>
-            </a:r>
-            <a:r>
-              <a:rPr lang="pt-BR" dirty="0" smtClean="0"/>
-              <a:t>você </a:t>
-            </a:r>
-            <a:r>
-              <a:rPr lang="pt-BR" dirty="0"/>
-              <a:t>configure vários tipos de fluxos de trabalho que não são possíveis em sistemas </a:t>
-            </a:r>
-            <a:r>
-              <a:rPr lang="pt-BR" dirty="0" smtClean="0"/>
-              <a:t>centralizados.</a:t>
-            </a:r>
-            <a:endParaRPr lang="pt-BR" dirty="0"/>
+              <a:t>Muitos destes sistemas trabalham com vários repositórios remotos, possibilitando que você configure vários tipos de fluxos de trabalho que não são possíveis em sistemas centralizados.</a:t>
+            </a:r>
           </a:p>
         </p:txBody>
       </p:sp>

</xml_diff>